<commit_message>
Update Capstone_Final_Slides - Image Captioning.pptx
</commit_message>
<xml_diff>
--- a/Capstone 3/Coco dataset/Documents/Capstone_Final_Slides - Image Captioning.pptx
+++ b/Capstone 3/Coco dataset/Documents/Capstone_Final_Slides - Image Captioning.pptx
@@ -13,6 +13,7 @@
     <p:sldId id="262" r:id="rId7"/>
     <p:sldId id="263" r:id="rId8"/>
     <p:sldId id="264" r:id="rId9"/>
+    <p:sldId id="265" r:id="rId10"/>
   </p:sldIdLst>
   <p:sldSz cx="12192000" cy="6858000"/>
   <p:notesSz cx="6858000" cy="9144000"/>
@@ -282,7 +283,7 @@
           <a:p>
             <a:fld id="{6958BE10-04A6-45EC-B76A-4BD025FF519B}" type="datetimeFigureOut">
               <a:rPr lang="en-US" smtClean="0"/>
-              <a:t>2/28/2024</a:t>
+              <a:t>2/29/2024</a:t>
             </a:fld>
             <a:endParaRPr lang="en-US"/>
           </a:p>
@@ -452,7 +453,7 @@
           <a:p>
             <a:fld id="{6958BE10-04A6-45EC-B76A-4BD025FF519B}" type="datetimeFigureOut">
               <a:rPr lang="en-US" smtClean="0"/>
-              <a:t>2/28/2024</a:t>
+              <a:t>2/29/2024</a:t>
             </a:fld>
             <a:endParaRPr lang="en-US"/>
           </a:p>
@@ -632,7 +633,7 @@
           <a:p>
             <a:fld id="{6958BE10-04A6-45EC-B76A-4BD025FF519B}" type="datetimeFigureOut">
               <a:rPr lang="en-US" smtClean="0"/>
-              <a:t>2/28/2024</a:t>
+              <a:t>2/29/2024</a:t>
             </a:fld>
             <a:endParaRPr lang="en-US"/>
           </a:p>
@@ -802,7 +803,7 @@
           <a:p>
             <a:fld id="{6958BE10-04A6-45EC-B76A-4BD025FF519B}" type="datetimeFigureOut">
               <a:rPr lang="en-US" smtClean="0"/>
-              <a:t>2/28/2024</a:t>
+              <a:t>2/29/2024</a:t>
             </a:fld>
             <a:endParaRPr lang="en-US"/>
           </a:p>
@@ -1070,7 +1071,7 @@
           <a:p>
             <a:fld id="{6958BE10-04A6-45EC-B76A-4BD025FF519B}" type="datetimeFigureOut">
               <a:rPr lang="en-US" smtClean="0"/>
-              <a:t>2/28/2024</a:t>
+              <a:t>2/29/2024</a:t>
             </a:fld>
             <a:endParaRPr lang="en-US"/>
           </a:p>
@@ -1302,7 +1303,7 @@
           <a:p>
             <a:fld id="{6958BE10-04A6-45EC-B76A-4BD025FF519B}" type="datetimeFigureOut">
               <a:rPr lang="en-US" smtClean="0"/>
-              <a:t>2/28/2024</a:t>
+              <a:t>2/29/2024</a:t>
             </a:fld>
             <a:endParaRPr lang="en-US"/>
           </a:p>
@@ -1661,7 +1662,7 @@
           <a:p>
             <a:fld id="{6958BE10-04A6-45EC-B76A-4BD025FF519B}" type="datetimeFigureOut">
               <a:rPr lang="en-US" smtClean="0"/>
-              <a:t>2/28/2024</a:t>
+              <a:t>2/29/2024</a:t>
             </a:fld>
             <a:endParaRPr lang="en-US"/>
           </a:p>
@@ -1802,7 +1803,7 @@
           <a:p>
             <a:fld id="{6958BE10-04A6-45EC-B76A-4BD025FF519B}" type="datetimeFigureOut">
               <a:rPr lang="en-US" smtClean="0"/>
-              <a:t>2/28/2024</a:t>
+              <a:t>2/29/2024</a:t>
             </a:fld>
             <a:endParaRPr lang="en-US"/>
           </a:p>
@@ -1897,7 +1898,7 @@
           <a:p>
             <a:fld id="{6958BE10-04A6-45EC-B76A-4BD025FF519B}" type="datetimeFigureOut">
               <a:rPr lang="en-US" smtClean="0"/>
-              <a:t>2/28/2024</a:t>
+              <a:t>2/29/2024</a:t>
             </a:fld>
             <a:endParaRPr lang="en-US"/>
           </a:p>
@@ -2254,7 +2255,7 @@
           <a:p>
             <a:fld id="{6958BE10-04A6-45EC-B76A-4BD025FF519B}" type="datetimeFigureOut">
               <a:rPr lang="en-US" smtClean="0"/>
-              <a:t>2/28/2024</a:t>
+              <a:t>2/29/2024</a:t>
             </a:fld>
             <a:endParaRPr lang="en-US"/>
           </a:p>
@@ -2611,7 +2612,7 @@
           <a:p>
             <a:fld id="{6958BE10-04A6-45EC-B76A-4BD025FF519B}" type="datetimeFigureOut">
               <a:rPr lang="en-US" smtClean="0"/>
-              <a:t>2/28/2024</a:t>
+              <a:t>2/29/2024</a:t>
             </a:fld>
             <a:endParaRPr lang="en-US"/>
           </a:p>
@@ -2853,7 +2854,7 @@
           <a:p>
             <a:fld id="{6958BE10-04A6-45EC-B76A-4BD025FF519B}" type="datetimeFigureOut">
               <a:rPr lang="en-US" smtClean="0"/>
-              <a:t>2/28/2024</a:t>
+              <a:t>2/29/2024</a:t>
             </a:fld>
             <a:endParaRPr lang="en-US"/>
           </a:p>
@@ -5657,6 +5658,69 @@
 </p:sld>
 </file>
 
+<file path=ppt/slides/slide9.xml><?xml version="1.0" encoding="utf-8"?>
+<p:sld xmlns:a="http://schemas.openxmlformats.org/drawingml/2006/main" xmlns:r="http://schemas.openxmlformats.org/officeDocument/2006/relationships" xmlns:p="http://schemas.openxmlformats.org/presentationml/2006/main">
+  <p:cSld>
+    <p:spTree>
+      <p:nvGrpSpPr>
+        <p:cNvPr id="1" name=""/>
+        <p:cNvGrpSpPr/>
+        <p:nvPr/>
+      </p:nvGrpSpPr>
+      <p:grpSpPr>
+        <a:xfrm>
+          <a:off x="0" y="0"/>
+          <a:ext cx="0" cy="0"/>
+          <a:chOff x="0" y="0"/>
+          <a:chExt cx="0" cy="0"/>
+        </a:xfrm>
+      </p:grpSpPr>
+      <p:sp>
+        <p:nvSpPr>
+          <p:cNvPr id="2" name="Title 1">
+            <a:extLst>
+              <a:ext uri="{FF2B5EF4-FFF2-40B4-BE49-F238E27FC236}">
+                <a16:creationId xmlns:a16="http://schemas.microsoft.com/office/drawing/2014/main" id="{E479E047-B9CF-AEE9-36E4-FBECA53176A3}"/>
+              </a:ext>
+            </a:extLst>
+          </p:cNvPr>
+          <p:cNvSpPr>
+            <a:spLocks noGrp="1"/>
+          </p:cNvSpPr>
+          <p:nvPr>
+            <p:ph type="title"/>
+          </p:nvPr>
+        </p:nvSpPr>
+        <p:spPr>
+          <a:xfrm>
+            <a:off x="2231136" y="2612337"/>
+            <a:ext cx="7729728" cy="1188720"/>
+          </a:xfrm>
+        </p:spPr>
+        <p:txBody>
+          <a:bodyPr/>
+          <a:lstStyle/>
+          <a:p>
+            <a:r>
+              <a:rPr lang="en-US" dirty="0"/>
+              <a:t>Conclusion</a:t>
+            </a:r>
+          </a:p>
+        </p:txBody>
+      </p:sp>
+    </p:spTree>
+    <p:extLst>
+      <p:ext uri="{BB962C8B-B14F-4D97-AF65-F5344CB8AC3E}">
+        <p14:creationId xmlns:p14="http://schemas.microsoft.com/office/powerpoint/2010/main" val="1694572463"/>
+      </p:ext>
+    </p:extLst>
+  </p:cSld>
+  <p:clrMapOvr>
+    <a:masterClrMapping/>
+  </p:clrMapOvr>
+</p:sld>
+</file>
+
 <file path=ppt/theme/theme1.xml><?xml version="1.0" encoding="utf-8"?>
 <a:theme xmlns:a="http://schemas.openxmlformats.org/drawingml/2006/main" name="Parcel">
   <a:themeElements>

</xml_diff>